<commit_message>
RASD v2 update (to do)
</commit_message>
<xml_diff>
--- a/OtherStuff/Presentation/Final presentation 4_3.pptx
+++ b/OtherStuff/Presentation/Final presentation 4_3.pptx
@@ -168,6 +168,11 @@
       </a:defRPr>
     </a:lvl9pPr>
   </p:defaultTextStyle>
+  <p:extLst>
+    <p:ext uri="{EFAFB233-063F-42B5-8137-9DF3F51BA10A}">
+      <p15:sldGuideLst xmlns:p15="http://schemas.microsoft.com/office/powerpoint/2012/main"/>
+    </p:ext>
+  </p:extLst>
 </p:presentation>
 </file>
 
@@ -302,7 +307,7 @@
           <a:p>
             <a:fld id="{C64D8BFE-D460-403E-A01A-5A404052F1BA}" type="datetimeFigureOut">
               <a:rPr lang="en-US" smtClean="0"/>
-              <a:t>11/10/2015</a:t>
+              <a:t>11/11/2015</a:t>
             </a:fld>
             <a:endParaRPr lang="en-US"/>
           </a:p>
@@ -472,7 +477,7 @@
           <a:p>
             <a:fld id="{C64D8BFE-D460-403E-A01A-5A404052F1BA}" type="datetimeFigureOut">
               <a:rPr lang="en-US" smtClean="0"/>
-              <a:t>11/10/2015</a:t>
+              <a:t>11/11/2015</a:t>
             </a:fld>
             <a:endParaRPr lang="en-US"/>
           </a:p>
@@ -652,7 +657,7 @@
           <a:p>
             <a:fld id="{C64D8BFE-D460-403E-A01A-5A404052F1BA}" type="datetimeFigureOut">
               <a:rPr lang="en-US" smtClean="0"/>
-              <a:t>11/10/2015</a:t>
+              <a:t>11/11/2015</a:t>
             </a:fld>
             <a:endParaRPr lang="en-US"/>
           </a:p>
@@ -822,7 +827,7 @@
           <a:p>
             <a:fld id="{C64D8BFE-D460-403E-A01A-5A404052F1BA}" type="datetimeFigureOut">
               <a:rPr lang="en-US" smtClean="0"/>
-              <a:t>11/10/2015</a:t>
+              <a:t>11/11/2015</a:t>
             </a:fld>
             <a:endParaRPr lang="en-US"/>
           </a:p>
@@ -1068,7 +1073,7 @@
           <a:p>
             <a:fld id="{C64D8BFE-D460-403E-A01A-5A404052F1BA}" type="datetimeFigureOut">
               <a:rPr lang="en-US" smtClean="0"/>
-              <a:t>11/10/2015</a:t>
+              <a:t>11/11/2015</a:t>
             </a:fld>
             <a:endParaRPr lang="en-US"/>
           </a:p>
@@ -1300,7 +1305,7 @@
           <a:p>
             <a:fld id="{C64D8BFE-D460-403E-A01A-5A404052F1BA}" type="datetimeFigureOut">
               <a:rPr lang="en-US" smtClean="0"/>
-              <a:t>11/10/2015</a:t>
+              <a:t>11/11/2015</a:t>
             </a:fld>
             <a:endParaRPr lang="en-US"/>
           </a:p>
@@ -1667,7 +1672,7 @@
           <a:p>
             <a:fld id="{C64D8BFE-D460-403E-A01A-5A404052F1BA}" type="datetimeFigureOut">
               <a:rPr lang="en-US" smtClean="0"/>
-              <a:t>11/10/2015</a:t>
+              <a:t>11/11/2015</a:t>
             </a:fld>
             <a:endParaRPr lang="en-US"/>
           </a:p>
@@ -1785,7 +1790,7 @@
           <a:p>
             <a:fld id="{C64D8BFE-D460-403E-A01A-5A404052F1BA}" type="datetimeFigureOut">
               <a:rPr lang="en-US" smtClean="0"/>
-              <a:t>11/10/2015</a:t>
+              <a:t>11/11/2015</a:t>
             </a:fld>
             <a:endParaRPr lang="en-US"/>
           </a:p>
@@ -1880,7 +1885,7 @@
           <a:p>
             <a:fld id="{C64D8BFE-D460-403E-A01A-5A404052F1BA}" type="datetimeFigureOut">
               <a:rPr lang="en-US" smtClean="0"/>
-              <a:t>11/10/2015</a:t>
+              <a:t>11/11/2015</a:t>
             </a:fld>
             <a:endParaRPr lang="en-US"/>
           </a:p>
@@ -2157,7 +2162,7 @@
           <a:p>
             <a:fld id="{C64D8BFE-D460-403E-A01A-5A404052F1BA}" type="datetimeFigureOut">
               <a:rPr lang="en-US" smtClean="0"/>
-              <a:t>11/10/2015</a:t>
+              <a:t>11/11/2015</a:t>
             </a:fld>
             <a:endParaRPr lang="en-US"/>
           </a:p>
@@ -2410,7 +2415,7 @@
           <a:p>
             <a:fld id="{C64D8BFE-D460-403E-A01A-5A404052F1BA}" type="datetimeFigureOut">
               <a:rPr lang="en-US" smtClean="0"/>
-              <a:t>11/10/2015</a:t>
+              <a:t>11/11/2015</a:t>
             </a:fld>
             <a:endParaRPr lang="en-US"/>
           </a:p>
@@ -2623,7 +2628,7 @@
           <a:p>
             <a:fld id="{C64D8BFE-D460-403E-A01A-5A404052F1BA}" type="datetimeFigureOut">
               <a:rPr lang="en-US" smtClean="0"/>
-              <a:t>11/10/2015</a:t>
+              <a:t>11/11/2015</a:t>
             </a:fld>
             <a:endParaRPr lang="en-US"/>
           </a:p>
@@ -4849,7 +4854,7 @@
                                         <p:tgtEl>
                                           <p:spTgt spid="3">
                                             <p:txEl>
-                                              <p:pRg st="3" end="3"/>
+                                              <p:pRg st="4" end="4"/>
                                             </p:txEl>
                                           </p:spTgt>
                                         </p:tgtEl>
@@ -4867,7 +4872,7 @@
                                         <p:tgtEl>
                                           <p:spTgt spid="3">
                                             <p:txEl>
-                                              <p:pRg st="3" end="3"/>
+                                              <p:pRg st="4" end="4"/>
                                             </p:txEl>
                                           </p:spTgt>
                                         </p:tgtEl>
@@ -4910,7 +4915,7 @@
                                         <p:tgtEl>
                                           <p:spTgt spid="3">
                                             <p:txEl>
-                                              <p:pRg st="4" end="4"/>
+                                              <p:pRg st="6" end="6"/>
                                             </p:txEl>
                                           </p:spTgt>
                                         </p:tgtEl>
@@ -4928,7 +4933,7 @@
                                         <p:tgtEl>
                                           <p:spTgt spid="3">
                                             <p:txEl>
-                                              <p:pRg st="4" end="4"/>
+                                              <p:pRg st="6" end="6"/>
                                             </p:txEl>
                                           </p:spTgt>
                                         </p:tgtEl>
@@ -4971,7 +4976,7 @@
                                         <p:tgtEl>
                                           <p:spTgt spid="3">
                                             <p:txEl>
-                                              <p:pRg st="6" end="6"/>
+                                              <p:pRg st="8" end="8"/>
                                             </p:txEl>
                                           </p:spTgt>
                                         </p:tgtEl>
@@ -4986,67 +4991,6 @@
                                     <p:animEffect transition="in" filter="fade">
                                       <p:cBhvr>
                                         <p:cTn id="29" dur="500"/>
-                                        <p:tgtEl>
-                                          <p:spTgt spid="3">
-                                            <p:txEl>
-                                              <p:pRg st="6" end="6"/>
-                                            </p:txEl>
-                                          </p:spTgt>
-                                        </p:tgtEl>
-                                      </p:cBhvr>
-                                    </p:animEffect>
-                                  </p:childTnLst>
-                                </p:cTn>
-                              </p:par>
-                            </p:childTnLst>
-                          </p:cTn>
-                        </p:par>
-                      </p:childTnLst>
-                    </p:cTn>
-                  </p:par>
-                  <p:par>
-                    <p:cTn id="30" fill="hold">
-                      <p:stCondLst>
-                        <p:cond delay="indefinite"/>
-                      </p:stCondLst>
-                      <p:childTnLst>
-                        <p:par>
-                          <p:cTn id="31" fill="hold">
-                            <p:stCondLst>
-                              <p:cond delay="0"/>
-                            </p:stCondLst>
-                            <p:childTnLst>
-                              <p:par>
-                                <p:cTn id="32" presetID="10" presetClass="entr" presetSubtype="0" fill="hold" nodeType="clickEffect">
-                                  <p:stCondLst>
-                                    <p:cond delay="0"/>
-                                  </p:stCondLst>
-                                  <p:childTnLst>
-                                    <p:set>
-                                      <p:cBhvr>
-                                        <p:cTn id="33" dur="1" fill="hold">
-                                          <p:stCondLst>
-                                            <p:cond delay="0"/>
-                                          </p:stCondLst>
-                                        </p:cTn>
-                                        <p:tgtEl>
-                                          <p:spTgt spid="3">
-                                            <p:txEl>
-                                              <p:pRg st="8" end="8"/>
-                                            </p:txEl>
-                                          </p:spTgt>
-                                        </p:tgtEl>
-                                        <p:attrNameLst>
-                                          <p:attrName>style.visibility</p:attrName>
-                                        </p:attrNameLst>
-                                      </p:cBhvr>
-                                      <p:to>
-                                        <p:strVal val="visible"/>
-                                      </p:to>
-                                    </p:set>
-                                    <p:animEffect transition="in" filter="fade">
-                                      <p:cBhvr>
-                                        <p:cTn id="34" dur="500"/>
                                         <p:tgtEl>
                                           <p:spTgt spid="3">
                                             <p:txEl>
@@ -9968,7 +9912,110 @@
               <a:rPr lang="en-US" dirty="0">
                 <a:latin typeface="Georgia" panose="02040502050405020303" pitchFamily="18" charset="0"/>
               </a:rPr>
-              <a:t>request or reservation only if it has not been assigned to a taxi driver yet.</a:t>
+              <a:t>request or reservation only if it has not been assigned to a taxi driver yet</a:t>
+            </a:r>
+            <a:r>
+              <a:rPr lang="en-US" dirty="0" smtClean="0">
+                <a:latin typeface="Georgia" panose="02040502050405020303" pitchFamily="18" charset="0"/>
+              </a:rPr>
+              <a:t>.</a:t>
+            </a:r>
+          </a:p>
+          <a:p>
+            <a:endParaRPr lang="en-US" dirty="0" smtClean="0">
+              <a:latin typeface="Georgia" panose="02040502050405020303" pitchFamily="18" charset="0"/>
+            </a:endParaRPr>
+          </a:p>
+          <a:p>
+            <a:r>
+              <a:rPr lang="it-IT" dirty="0" smtClean="0">
+                <a:latin typeface="Georgia" panose="02040502050405020303" pitchFamily="18" charset="0"/>
+              </a:rPr>
+              <a:t>[R2] </a:t>
+            </a:r>
+            <a:r>
+              <a:rPr lang="it-IT" dirty="0" err="1" smtClean="0">
+                <a:latin typeface="Georgia" panose="02040502050405020303" pitchFamily="18" charset="0"/>
+              </a:rPr>
+              <a:t>Customers</a:t>
+            </a:r>
+            <a:r>
+              <a:rPr lang="it-IT" dirty="0" smtClean="0">
+                <a:latin typeface="Georgia" panose="02040502050405020303" pitchFamily="18" charset="0"/>
+              </a:rPr>
+              <a:t> must be </a:t>
+            </a:r>
+            <a:r>
+              <a:rPr lang="it-IT" dirty="0" err="1" smtClean="0">
+                <a:latin typeface="Georgia" panose="02040502050405020303" pitchFamily="18" charset="0"/>
+              </a:rPr>
+              <a:t>able</a:t>
+            </a:r>
+            <a:r>
+              <a:rPr lang="it-IT" dirty="0" smtClean="0">
+                <a:latin typeface="Georgia" panose="02040502050405020303" pitchFamily="18" charset="0"/>
+              </a:rPr>
+              <a:t> to </a:t>
+            </a:r>
+            <a:r>
+              <a:rPr lang="it-IT" dirty="0" err="1" smtClean="0">
+                <a:latin typeface="Georgia" panose="02040502050405020303" pitchFamily="18" charset="0"/>
+              </a:rPr>
+              <a:t>visualize</a:t>
+            </a:r>
+            <a:r>
+              <a:rPr lang="it-IT" dirty="0" smtClean="0">
+                <a:latin typeface="Georgia" panose="02040502050405020303" pitchFamily="18" charset="0"/>
+              </a:rPr>
+              <a:t> the list of </a:t>
+            </a:r>
+            <a:r>
+              <a:rPr lang="it-IT" dirty="0" err="1" smtClean="0">
+                <a:latin typeface="Georgia" panose="02040502050405020303" pitchFamily="18" charset="0"/>
+              </a:rPr>
+              <a:t>all</a:t>
+            </a:r>
+            <a:r>
+              <a:rPr lang="it-IT" dirty="0" smtClean="0">
+                <a:latin typeface="Georgia" panose="02040502050405020303" pitchFamily="18" charset="0"/>
+              </a:rPr>
+              <a:t> </a:t>
+            </a:r>
+            <a:r>
+              <a:rPr lang="it-IT" dirty="0" err="1" smtClean="0">
+                <a:latin typeface="Georgia" panose="02040502050405020303" pitchFamily="18" charset="0"/>
+              </a:rPr>
+              <a:t>their</a:t>
+            </a:r>
+            <a:r>
+              <a:rPr lang="it-IT" dirty="0" smtClean="0">
+                <a:latin typeface="Georgia" panose="02040502050405020303" pitchFamily="18" charset="0"/>
+              </a:rPr>
+              <a:t> </a:t>
+            </a:r>
+            <a:r>
+              <a:rPr lang="it-IT" dirty="0" err="1" smtClean="0">
+                <a:latin typeface="Georgia" panose="02040502050405020303" pitchFamily="18" charset="0"/>
+              </a:rPr>
+              <a:t>requests</a:t>
+            </a:r>
+            <a:r>
+              <a:rPr lang="it-IT" dirty="0" smtClean="0">
+                <a:latin typeface="Georgia" panose="02040502050405020303" pitchFamily="18" charset="0"/>
+              </a:rPr>
+              <a:t> and </a:t>
+            </a:r>
+            <a:r>
+              <a:rPr lang="it-IT" dirty="0" err="1" smtClean="0">
+                <a:latin typeface="Georgia" panose="02040502050405020303" pitchFamily="18" charset="0"/>
+              </a:rPr>
+              <a:t>reservations</a:t>
+            </a:r>
+            <a:r>
+              <a:rPr lang="it-IT" dirty="0" smtClean="0">
+                <a:latin typeface="Georgia" panose="02040502050405020303" pitchFamily="18" charset="0"/>
+              </a:rPr>
+              <a:t>.</a:t>
             </a:r>
             <a:endParaRPr lang="it-IT" dirty="0">
               <a:latin typeface="Georgia" panose="02040502050405020303" pitchFamily="18" charset="0"/>
@@ -10138,6 +10185,67 @@
                                           <p:spTgt spid="3">
                                             <p:txEl>
                                               <p:pRg st="0" end="0"/>
+                                            </p:txEl>
+                                          </p:spTgt>
+                                        </p:tgtEl>
+                                      </p:cBhvr>
+                                    </p:animEffect>
+                                  </p:childTnLst>
+                                </p:cTn>
+                              </p:par>
+                            </p:childTnLst>
+                          </p:cTn>
+                        </p:par>
+                      </p:childTnLst>
+                    </p:cTn>
+                  </p:par>
+                  <p:par>
+                    <p:cTn id="8" fill="hold">
+                      <p:stCondLst>
+                        <p:cond delay="indefinite"/>
+                      </p:stCondLst>
+                      <p:childTnLst>
+                        <p:par>
+                          <p:cTn id="9" fill="hold">
+                            <p:stCondLst>
+                              <p:cond delay="0"/>
+                            </p:stCondLst>
+                            <p:childTnLst>
+                              <p:par>
+                                <p:cTn id="10" presetID="10" presetClass="entr" presetSubtype="0" fill="hold" grpId="0" nodeType="clickEffect">
+                                  <p:stCondLst>
+                                    <p:cond delay="0"/>
+                                  </p:stCondLst>
+                                  <p:childTnLst>
+                                    <p:set>
+                                      <p:cBhvr>
+                                        <p:cTn id="11" dur="1" fill="hold">
+                                          <p:stCondLst>
+                                            <p:cond delay="0"/>
+                                          </p:stCondLst>
+                                        </p:cTn>
+                                        <p:tgtEl>
+                                          <p:spTgt spid="3">
+                                            <p:txEl>
+                                              <p:pRg st="2" end="2"/>
+                                            </p:txEl>
+                                          </p:spTgt>
+                                        </p:tgtEl>
+                                        <p:attrNameLst>
+                                          <p:attrName>style.visibility</p:attrName>
+                                        </p:attrNameLst>
+                                      </p:cBhvr>
+                                      <p:to>
+                                        <p:strVal val="visible"/>
+                                      </p:to>
+                                    </p:set>
+                                    <p:animEffect transition="in" filter="fade">
+                                      <p:cBhvr>
+                                        <p:cTn id="12" dur="500"/>
+                                        <p:tgtEl>
+                                          <p:spTgt spid="3">
+                                            <p:txEl>
+                                              <p:pRg st="2" end="2"/>
                                             </p:txEl>
                                           </p:spTgt>
                                         </p:tgtEl>
@@ -10583,11 +10691,11 @@
   <p:clrMapOvr>
     <a:masterClrMapping/>
   </p:clrMapOvr>
-  <mc:AlternateContent xmlns:mc="http://schemas.openxmlformats.org/markup-compatibility/2006">
-    <mc:Choice xmlns:p14="http://schemas.microsoft.com/office/powerpoint/2010/main" Requires="p14">
+  <mc:AlternateContent xmlns:mc="http://schemas.openxmlformats.org/markup-compatibility/2006" xmlns:p14="http://schemas.microsoft.com/office/powerpoint/2010/main">
+    <mc:Choice Requires="p14">
       <p:transition spd="slow" p14:dur="2000"/>
     </mc:Choice>
-    <mc:Fallback>
+    <mc:Fallback xmlns="">
       <p:transition spd="slow"/>
     </mc:Fallback>
   </mc:AlternateContent>
@@ -10886,11 +10994,11 @@
   <p:clrMapOvr>
     <a:masterClrMapping/>
   </p:clrMapOvr>
-  <mc:AlternateContent xmlns:mc="http://schemas.openxmlformats.org/markup-compatibility/2006">
-    <mc:Choice xmlns:p14="http://schemas.microsoft.com/office/powerpoint/2010/main" Requires="p14">
+  <mc:AlternateContent xmlns:mc="http://schemas.openxmlformats.org/markup-compatibility/2006" xmlns:p14="http://schemas.microsoft.com/office/powerpoint/2010/main">
+    <mc:Choice Requires="p14">
       <p:transition spd="slow" p14:dur="2000"/>
     </mc:Choice>
-    <mc:Fallback>
+    <mc:Fallback xmlns="">
       <p:transition spd="slow"/>
     </mc:Fallback>
   </mc:AlternateContent>
@@ -13054,102 +13162,102 @@
           <a:p>
             <a:pPr lvl="0"/>
             <a:r>
-              <a:rPr lang="en-US" dirty="0" smtClean="0">
+              <a:rPr lang="en-US" sz="2500" dirty="0" smtClean="0">
                 <a:latin typeface="Georgia" panose="02040502050405020303" pitchFamily="18" charset="0"/>
               </a:rPr>
               <a:t>[</a:t>
             </a:r>
             <a:r>
-              <a:rPr lang="en-US" b="1" dirty="0" smtClean="0">
+              <a:rPr lang="en-US" sz="2500" b="1" dirty="0" smtClean="0">
                 <a:latin typeface="Georgia" panose="02040502050405020303" pitchFamily="18" charset="0"/>
               </a:rPr>
               <a:t>N1</a:t>
             </a:r>
             <a:r>
-              <a:rPr lang="en-US" dirty="0" smtClean="0">
+              <a:rPr lang="en-US" sz="2500" dirty="0" smtClean="0">
                 <a:latin typeface="Georgia" panose="02040502050405020303" pitchFamily="18" charset="0"/>
               </a:rPr>
               <a:t>] </a:t>
             </a:r>
             <a:r>
-              <a:rPr lang="en-US" dirty="0" err="1" smtClean="0">
+              <a:rPr lang="en-US" sz="2500" dirty="0" err="1" smtClean="0">
                 <a:latin typeface="Georgia" panose="02040502050405020303" pitchFamily="18" charset="0"/>
               </a:rPr>
               <a:t>MyTaxiService’s</a:t>
             </a:r>
             <a:r>
-              <a:rPr lang="en-US" dirty="0" smtClean="0">
+              <a:rPr lang="en-US" sz="2500" dirty="0" smtClean="0">
                 <a:latin typeface="Georgia" panose="02040502050405020303" pitchFamily="18" charset="0"/>
               </a:rPr>
               <a:t> </a:t>
             </a:r>
             <a:r>
-              <a:rPr lang="en-US" dirty="0">
+              <a:rPr lang="en-US" sz="2500" dirty="0">
                 <a:latin typeface="Georgia" panose="02040502050405020303" pitchFamily="18" charset="0"/>
               </a:rPr>
               <a:t>system should be available 24/7.</a:t>
             </a:r>
-            <a:endParaRPr lang="it-IT" dirty="0">
+            <a:endParaRPr lang="it-IT" sz="2500" dirty="0">
               <a:latin typeface="Georgia" panose="02040502050405020303" pitchFamily="18" charset="0"/>
             </a:endParaRPr>
           </a:p>
           <a:p>
             <a:pPr lvl="0"/>
             <a:r>
-              <a:rPr lang="en-US" dirty="0" smtClean="0">
+              <a:rPr lang="en-US" sz="2500" dirty="0" smtClean="0">
                 <a:latin typeface="Georgia" panose="02040502050405020303" pitchFamily="18" charset="0"/>
               </a:rPr>
               <a:t>[</a:t>
             </a:r>
             <a:r>
-              <a:rPr lang="en-US" b="1" dirty="0" smtClean="0">
+              <a:rPr lang="en-US" sz="2500" b="1" dirty="0" smtClean="0">
                 <a:latin typeface="Georgia" panose="02040502050405020303" pitchFamily="18" charset="0"/>
               </a:rPr>
               <a:t>N2</a:t>
             </a:r>
             <a:r>
-              <a:rPr lang="en-US" dirty="0" smtClean="0">
+              <a:rPr lang="en-US" sz="2500" dirty="0" smtClean="0">
                 <a:latin typeface="Georgia" panose="02040502050405020303" pitchFamily="18" charset="0"/>
               </a:rPr>
               <a:t>] The </a:t>
             </a:r>
             <a:r>
-              <a:rPr lang="en-US" dirty="0">
+              <a:rPr lang="en-US" sz="2500" dirty="0">
                 <a:latin typeface="Georgia" panose="02040502050405020303" pitchFamily="18" charset="0"/>
               </a:rPr>
               <a:t>waiting time for a taxi to come that is showed to customers should be updated every 30 seconds.</a:t>
             </a:r>
-            <a:endParaRPr lang="it-IT" dirty="0">
+            <a:endParaRPr lang="it-IT" sz="2500" dirty="0">
               <a:latin typeface="Georgia" panose="02040502050405020303" pitchFamily="18" charset="0"/>
             </a:endParaRPr>
           </a:p>
           <a:p>
             <a:pPr lvl="0"/>
             <a:r>
-              <a:rPr lang="en-US" dirty="0" smtClean="0">
+              <a:rPr lang="en-US" sz="2500" dirty="0" smtClean="0">
                 <a:latin typeface="Georgia" panose="02040502050405020303" pitchFamily="18" charset="0"/>
               </a:rPr>
               <a:t>[</a:t>
             </a:r>
             <a:r>
-              <a:rPr lang="en-US" b="1" dirty="0" smtClean="0">
+              <a:rPr lang="en-US" sz="2500" b="1" dirty="0" smtClean="0">
                 <a:latin typeface="Georgia" panose="02040502050405020303" pitchFamily="18" charset="0"/>
               </a:rPr>
               <a:t>N3</a:t>
             </a:r>
             <a:r>
-              <a:rPr lang="en-US" dirty="0" smtClean="0">
+              <a:rPr lang="en-US" sz="2500" dirty="0" smtClean="0">
                 <a:latin typeface="Georgia" panose="02040502050405020303" pitchFamily="18" charset="0"/>
               </a:rPr>
               <a:t>] Every </a:t>
             </a:r>
             <a:r>
-              <a:rPr lang="en-US" dirty="0">
+              <a:rPr lang="en-US" sz="2500" dirty="0">
                 <a:latin typeface="Georgia" panose="02040502050405020303" pitchFamily="18" charset="0"/>
               </a:rPr>
               <a:t>functionality offered by the mobile or web application after the login should be reachable within three clicks.</a:t>
             </a:r>
-            <a:endParaRPr lang="it-IT" dirty="0">
+            <a:endParaRPr lang="it-IT" sz="2500" dirty="0">
               <a:latin typeface="Georgia" panose="02040502050405020303" pitchFamily="18" charset="0"/>
             </a:endParaRPr>
           </a:p>
@@ -13466,25 +13574,25 @@
           <a:lstStyle/>
           <a:p>
             <a:r>
-              <a:rPr lang="en-US" dirty="0">
+              <a:rPr lang="en-US" sz="2500" dirty="0">
                 <a:latin typeface="Georgia" panose="02040502050405020303" pitchFamily="18" charset="0"/>
               </a:rPr>
               <a:t>[</a:t>
             </a:r>
             <a:r>
-              <a:rPr lang="en-US" b="1" dirty="0">
+              <a:rPr lang="en-US" sz="2500" b="1" dirty="0">
                 <a:latin typeface="Georgia" panose="02040502050405020303" pitchFamily="18" charset="0"/>
               </a:rPr>
               <a:t>N4</a:t>
             </a:r>
             <a:r>
-              <a:rPr lang="en-US" dirty="0">
+              <a:rPr lang="en-US" sz="2500" dirty="0">
                 <a:latin typeface="Georgia" panose="02040502050405020303" pitchFamily="18" charset="0"/>
               </a:rPr>
               <a:t>] Mobile applications’ button available to taxi drivers should be big enough to be easily recognized and pressed while driving</a:t>
             </a:r>
             <a:r>
-              <a:rPr lang="en-US" dirty="0" smtClean="0">
+              <a:rPr lang="en-US" sz="2500" dirty="0" smtClean="0">
                 <a:latin typeface="Georgia" panose="02040502050405020303" pitchFamily="18" charset="0"/>
               </a:rPr>
               <a:t>.</a:t>
@@ -13493,66 +13601,66 @@
           <a:p>
             <a:pPr lvl="0"/>
             <a:r>
-              <a:rPr lang="en-US" dirty="0" smtClean="0">
+              <a:rPr lang="en-US" sz="2500" dirty="0" smtClean="0">
                 <a:latin typeface="Georgia" panose="02040502050405020303" pitchFamily="18" charset="0"/>
               </a:rPr>
               <a:t>[</a:t>
             </a:r>
             <a:r>
-              <a:rPr lang="en-US" b="1" dirty="0" smtClean="0">
+              <a:rPr lang="en-US" sz="2500" b="1" dirty="0" smtClean="0">
                 <a:latin typeface="Georgia" panose="02040502050405020303" pitchFamily="18" charset="0"/>
               </a:rPr>
               <a:t>N5</a:t>
             </a:r>
             <a:r>
-              <a:rPr lang="en-US" dirty="0" smtClean="0">
+              <a:rPr lang="en-US" sz="2500" dirty="0" smtClean="0">
                 <a:latin typeface="Georgia" panose="02040502050405020303" pitchFamily="18" charset="0"/>
               </a:rPr>
               <a:t>] Email </a:t>
             </a:r>
             <a:r>
-              <a:rPr lang="en-US" dirty="0">
+              <a:rPr lang="en-US" sz="2500" dirty="0">
                 <a:latin typeface="Georgia" panose="02040502050405020303" pitchFamily="18" charset="0"/>
               </a:rPr>
               <a:t>sent to the user in order to confirm registration should arrive in less than 10 minutes.</a:t>
             </a:r>
-            <a:endParaRPr lang="it-IT" dirty="0">
+            <a:endParaRPr lang="it-IT" sz="2500" dirty="0">
               <a:latin typeface="Georgia" panose="02040502050405020303" pitchFamily="18" charset="0"/>
             </a:endParaRPr>
           </a:p>
           <a:p>
             <a:pPr lvl="0"/>
             <a:r>
-              <a:rPr lang="en-US" dirty="0" smtClean="0">
+              <a:rPr lang="en-US" sz="2500" dirty="0" smtClean="0">
                 <a:latin typeface="Georgia" panose="02040502050405020303" pitchFamily="18" charset="0"/>
               </a:rPr>
               <a:t>[</a:t>
             </a:r>
             <a:r>
-              <a:rPr lang="en-US" b="1" dirty="0" smtClean="0">
+              <a:rPr lang="en-US" sz="2500" b="1" dirty="0" smtClean="0">
                 <a:latin typeface="Georgia" panose="02040502050405020303" pitchFamily="18" charset="0"/>
               </a:rPr>
               <a:t>N6</a:t>
             </a:r>
             <a:r>
-              <a:rPr lang="en-US" dirty="0" smtClean="0">
+              <a:rPr lang="en-US" sz="2500" dirty="0" smtClean="0">
                 <a:latin typeface="Georgia" panose="02040502050405020303" pitchFamily="18" charset="0"/>
               </a:rPr>
               <a:t>] Web </a:t>
             </a:r>
             <a:r>
-              <a:rPr lang="en-US" dirty="0">
+              <a:rPr lang="en-US" sz="2500" dirty="0">
                 <a:latin typeface="Georgia" panose="02040502050405020303" pitchFamily="18" charset="0"/>
               </a:rPr>
               <a:t>and mobile applications should have a similar graphics so that the correlation between the two would be immediately identified by customers</a:t>
             </a:r>
             <a:r>
-              <a:rPr lang="en-US" dirty="0" smtClean="0">
+              <a:rPr lang="en-US" sz="2500" dirty="0" smtClean="0">
                 <a:latin typeface="Georgia" panose="02040502050405020303" pitchFamily="18" charset="0"/>
               </a:rPr>
               <a:t>.</a:t>
             </a:r>
-            <a:endParaRPr lang="it-IT" dirty="0">
+            <a:endParaRPr lang="it-IT" sz="2500" dirty="0">
               <a:latin typeface="Georgia" panose="02040502050405020303" pitchFamily="18" charset="0"/>
             </a:endParaRPr>
           </a:p>
@@ -13860,35 +13968,37 @@
         </p:nvSpPr>
         <p:spPr/>
         <p:txBody>
-          <a:bodyPr/>
+          <a:bodyPr>
+            <a:normAutofit/>
+          </a:bodyPr>
           <a:lstStyle/>
           <a:p>
             <a:r>
-              <a:rPr lang="en-US" dirty="0">
+              <a:rPr lang="en-US" sz="2500" dirty="0">
                 <a:latin typeface="Georgia" panose="02040502050405020303" pitchFamily="18" charset="0"/>
               </a:rPr>
               <a:t>[</a:t>
             </a:r>
             <a:r>
-              <a:rPr lang="en-US" b="1" dirty="0" smtClean="0">
+              <a:rPr lang="en-US" sz="2500" b="1" dirty="0" smtClean="0">
                 <a:latin typeface="Georgia" panose="02040502050405020303" pitchFamily="18" charset="0"/>
               </a:rPr>
               <a:t>N7</a:t>
             </a:r>
             <a:r>
-              <a:rPr lang="en-US" dirty="0" smtClean="0">
+              <a:rPr lang="en-US" sz="2500" dirty="0" smtClean="0">
                 <a:latin typeface="Georgia" panose="02040502050405020303" pitchFamily="18" charset="0"/>
               </a:rPr>
               <a:t>] </a:t>
             </a:r>
             <a:r>
-              <a:rPr lang="en-US" dirty="0">
+              <a:rPr lang="en-US" sz="2500" dirty="0">
                 <a:latin typeface="Georgia" panose="02040502050405020303" pitchFamily="18" charset="0"/>
               </a:rPr>
               <a:t>Mobile’s notifications should appear even when the user has not the app opened</a:t>
             </a:r>
             <a:r>
-              <a:rPr lang="en-US" dirty="0" smtClean="0">
+              <a:rPr lang="en-US" sz="2500" dirty="0" smtClean="0">
                 <a:latin typeface="Georgia" panose="02040502050405020303" pitchFamily="18" charset="0"/>
               </a:rPr>
               <a:t>.</a:t>
@@ -13897,78 +14007,78 @@
           <a:p>
             <a:pPr lvl="0"/>
             <a:r>
-              <a:rPr lang="en-US" dirty="0" smtClean="0">
+              <a:rPr lang="en-US" sz="2500" dirty="0" smtClean="0">
                 <a:latin typeface="Georgia" panose="02040502050405020303" pitchFamily="18" charset="0"/>
               </a:rPr>
               <a:t>[</a:t>
             </a:r>
             <a:r>
-              <a:rPr lang="en-US" b="1" dirty="0" smtClean="0">
+              <a:rPr lang="en-US" sz="2500" b="1" dirty="0" smtClean="0">
                 <a:latin typeface="Georgia" panose="02040502050405020303" pitchFamily="18" charset="0"/>
               </a:rPr>
               <a:t>N8</a:t>
             </a:r>
             <a:r>
-              <a:rPr lang="en-US" dirty="0" smtClean="0">
+              <a:rPr lang="en-US" sz="2500" dirty="0" smtClean="0">
                 <a:latin typeface="Georgia" panose="02040502050405020303" pitchFamily="18" charset="0"/>
               </a:rPr>
               <a:t>] The </a:t>
             </a:r>
             <a:r>
-              <a:rPr lang="en-US" dirty="0">
+              <a:rPr lang="en-US" sz="2500" dirty="0">
                 <a:latin typeface="Georgia" panose="02040502050405020303" pitchFamily="18" charset="0"/>
               </a:rPr>
               <a:t>description of the mobile application in the phone app store should point out clearly and briefly its functions, allowing a quick comprehension from any type of user.</a:t>
             </a:r>
-            <a:endParaRPr lang="it-IT" dirty="0">
+            <a:endParaRPr lang="it-IT" sz="2500" dirty="0">
               <a:latin typeface="Georgia" panose="02040502050405020303" pitchFamily="18" charset="0"/>
             </a:endParaRPr>
           </a:p>
           <a:p>
             <a:pPr lvl="0"/>
             <a:r>
-              <a:rPr lang="en-US" dirty="0" smtClean="0">
+              <a:rPr lang="en-US" sz="2500" dirty="0" smtClean="0">
                 <a:latin typeface="Georgia" panose="02040502050405020303" pitchFamily="18" charset="0"/>
               </a:rPr>
               <a:t>[</a:t>
             </a:r>
             <a:r>
-              <a:rPr lang="en-US" b="1" dirty="0" smtClean="0">
+              <a:rPr lang="en-US" sz="2500" b="1" dirty="0" smtClean="0">
                 <a:latin typeface="Georgia" panose="02040502050405020303" pitchFamily="18" charset="0"/>
               </a:rPr>
               <a:t>N9</a:t>
             </a:r>
             <a:r>
-              <a:rPr lang="en-US" dirty="0" smtClean="0">
+              <a:rPr lang="en-US" sz="2500" dirty="0" smtClean="0">
                 <a:latin typeface="Georgia" panose="02040502050405020303" pitchFamily="18" charset="0"/>
               </a:rPr>
               <a:t>] </a:t>
             </a:r>
             <a:r>
-              <a:rPr lang="en-US" dirty="0" err="1" smtClean="0">
+              <a:rPr lang="en-US" sz="2500" dirty="0" err="1" smtClean="0">
                 <a:latin typeface="Georgia" panose="02040502050405020303" pitchFamily="18" charset="0"/>
               </a:rPr>
               <a:t>MyTaxiService’s</a:t>
             </a:r>
             <a:r>
-              <a:rPr lang="en-US" dirty="0" smtClean="0">
+              <a:rPr lang="en-US" sz="2500" dirty="0" smtClean="0">
                 <a:latin typeface="Georgia" panose="02040502050405020303" pitchFamily="18" charset="0"/>
               </a:rPr>
               <a:t> </a:t>
             </a:r>
             <a:r>
-              <a:rPr lang="en-US" dirty="0">
+              <a:rPr lang="en-US" sz="2500" dirty="0">
                 <a:latin typeface="Georgia" panose="02040502050405020303" pitchFamily="18" charset="0"/>
               </a:rPr>
               <a:t>applications should always have imperceptible response time during the navigation within its forms</a:t>
             </a:r>
             <a:r>
-              <a:rPr lang="en-US" dirty="0" smtClean="0">
+              <a:rPr lang="en-US" sz="2500" dirty="0" smtClean="0">
                 <a:latin typeface="Georgia" panose="02040502050405020303" pitchFamily="18" charset="0"/>
               </a:rPr>
               <a:t>.</a:t>
             </a:r>
-            <a:endParaRPr lang="it-IT" dirty="0">
+            <a:endParaRPr lang="it-IT" sz="2500" dirty="0">
               <a:latin typeface="Georgia" panose="02040502050405020303" pitchFamily="18" charset="0"/>
             </a:endParaRPr>
           </a:p>
@@ -26880,7 +26990,27 @@
                 <a:ea typeface="Calibri" panose="020F0502020204030204" pitchFamily="34" charset="0"/>
                 <a:cs typeface="Times New Roman" panose="02020603050405020304" pitchFamily="18" charset="0"/>
               </a:rPr>
-              <a:t>  hasTaxi: set Taxi</a:t>
+              <a:t>  hasTaxi: </a:t>
+            </a:r>
+            <a:r>
+              <a:rPr lang="en-US" b="1" dirty="0">
+                <a:solidFill>
+                  <a:srgbClr val="1F00DA"/>
+                </a:solidFill>
+                <a:latin typeface="Lucida Console" panose="020B0609040504020204" pitchFamily="49" charset="0"/>
+                <a:ea typeface="Calibri" panose="020F0502020204030204" pitchFamily="34" charset="0"/>
+                <a:cs typeface="Times New Roman" panose="02020603050405020304" pitchFamily="18" charset="0"/>
+              </a:rPr>
+              <a:t>set</a:t>
+            </a:r>
+            <a:r>
+              <a:rPr lang="en-US" dirty="0" smtClean="0">
+                <a:effectLst/>
+                <a:latin typeface="Lucida Console" panose="020B0609040504020204" pitchFamily="49" charset="0"/>
+                <a:ea typeface="Calibri" panose="020F0502020204030204" pitchFamily="34" charset="0"/>
+                <a:cs typeface="Times New Roman" panose="02020603050405020304" pitchFamily="18" charset="0"/>
+              </a:rPr>
+              <a:t> Taxi</a:t>
             </a:r>
             <a:endParaRPr lang="it-IT" dirty="0" smtClean="0">
               <a:effectLst/>
@@ -27214,7 +27344,27 @@
                 <a:ea typeface="Calibri" panose="020F0502020204030204" pitchFamily="34" charset="0"/>
                 <a:cs typeface="Times New Roman" panose="02020603050405020304" pitchFamily="18" charset="0"/>
               </a:rPr>
-              <a:t>  hasZone: some TaxiZone</a:t>
+              <a:t>  hasZone: </a:t>
+            </a:r>
+            <a:r>
+              <a:rPr lang="en-US" b="1" dirty="0">
+                <a:solidFill>
+                  <a:srgbClr val="1F00DA"/>
+                </a:solidFill>
+                <a:latin typeface="Lucida Console" panose="020B0609040504020204" pitchFamily="49" charset="0"/>
+                <a:ea typeface="Calibri" panose="020F0502020204030204" pitchFamily="34" charset="0"/>
+                <a:cs typeface="Times New Roman" panose="02020603050405020304" pitchFamily="18" charset="0"/>
+              </a:rPr>
+              <a:t>some</a:t>
+            </a:r>
+            <a:r>
+              <a:rPr lang="en-US" dirty="0" smtClean="0">
+                <a:effectLst/>
+                <a:latin typeface="Lucida Console" panose="020B0609040504020204" pitchFamily="49" charset="0"/>
+                <a:ea typeface="Calibri" panose="020F0502020204030204" pitchFamily="34" charset="0"/>
+                <a:cs typeface="Times New Roman" panose="02020603050405020304" pitchFamily="18" charset="0"/>
+              </a:rPr>
+              <a:t> TaxiZone</a:t>
             </a:r>
             <a:endParaRPr lang="it-IT" dirty="0" smtClean="0">
               <a:effectLst/>
@@ -27396,7 +27546,27 @@
                 <a:ea typeface="Calibri" panose="020F0502020204030204" pitchFamily="34" charset="0"/>
                 <a:cs typeface="Times New Roman" panose="02020603050405020304" pitchFamily="18" charset="0"/>
               </a:rPr>
-              <a:t>  users: set User,</a:t>
+              <a:t>  users: </a:t>
+            </a:r>
+            <a:r>
+              <a:rPr lang="en-US" b="1" dirty="0">
+                <a:solidFill>
+                  <a:srgbClr val="1F00DA"/>
+                </a:solidFill>
+                <a:latin typeface="Lucida Console" panose="020B0609040504020204" pitchFamily="49" charset="0"/>
+                <a:ea typeface="Calibri" panose="020F0502020204030204" pitchFamily="34" charset="0"/>
+                <a:cs typeface="Times New Roman" panose="02020603050405020304" pitchFamily="18" charset="0"/>
+              </a:rPr>
+              <a:t>set</a:t>
+            </a:r>
+            <a:r>
+              <a:rPr lang="en-US" dirty="0" smtClean="0">
+                <a:effectLst/>
+                <a:latin typeface="Lucida Console" panose="020B0609040504020204" pitchFamily="49" charset="0"/>
+                <a:ea typeface="Calibri" panose="020F0502020204030204" pitchFamily="34" charset="0"/>
+                <a:cs typeface="Times New Roman" panose="02020603050405020304" pitchFamily="18" charset="0"/>
+              </a:rPr>
+              <a:t> User,</a:t>
             </a:r>
             <a:endParaRPr lang="it-IT" dirty="0" smtClean="0">
               <a:effectLst/>
@@ -27421,7 +27591,27 @@
                 <a:ea typeface="Calibri" panose="020F0502020204030204" pitchFamily="34" charset="0"/>
                 <a:cs typeface="Times New Roman" panose="02020603050405020304" pitchFamily="18" charset="0"/>
               </a:rPr>
-              <a:t>  taxiRide: set TaxiRide</a:t>
+              <a:t>  taxiRide: </a:t>
+            </a:r>
+            <a:r>
+              <a:rPr lang="en-US" b="1" dirty="0">
+                <a:solidFill>
+                  <a:srgbClr val="1F00DA"/>
+                </a:solidFill>
+                <a:latin typeface="Lucida Console" panose="020B0609040504020204" pitchFamily="49" charset="0"/>
+                <a:ea typeface="Calibri" panose="020F0502020204030204" pitchFamily="34" charset="0"/>
+                <a:cs typeface="Times New Roman" panose="02020603050405020304" pitchFamily="18" charset="0"/>
+              </a:rPr>
+              <a:t>set</a:t>
+            </a:r>
+            <a:r>
+              <a:rPr lang="en-US" dirty="0" smtClean="0">
+                <a:effectLst/>
+                <a:latin typeface="Lucida Console" panose="020B0609040504020204" pitchFamily="49" charset="0"/>
+                <a:ea typeface="Calibri" panose="020F0502020204030204" pitchFamily="34" charset="0"/>
+                <a:cs typeface="Times New Roman" panose="02020603050405020304" pitchFamily="18" charset="0"/>
+              </a:rPr>
+              <a:t> TaxiRide</a:t>
             </a:r>
             <a:endParaRPr lang="it-IT" dirty="0" smtClean="0">
               <a:effectLst/>

</xml_diff>